<commit_message>
fixing merge issues - unfixed
</commit_message>
<xml_diff>
--- a/SA_maize_AAEA2021.pptx
+++ b/SA_maize_AAEA2021.pptx
@@ -310,7 +310,7 @@
           <a:p>
             <a:fld id="{1160EA64-D806-43AC-9DF2-F8C432F32B4C}" type="datetimeFigureOut">
               <a:rPr lang="en-US" dirty="0"/>
-              <a:t>7/30/2021</a:t>
+              <a:t>8/1/2021</a:t>
             </a:fld>
             <a:endParaRPr lang="en-US" dirty="0"/>
           </a:p>
@@ -476,7 +476,7 @@
           <a:p>
             <a:fld id="{E9F9C37B-1D36-470B-8223-D6C91242EC14}" type="datetimeFigureOut">
               <a:rPr lang="en-US" dirty="0"/>
-              <a:t>7/30/2021</a:t>
+              <a:t>8/1/2021</a:t>
             </a:fld>
             <a:endParaRPr lang="en-US" dirty="0"/>
           </a:p>
@@ -651,7 +651,7 @@
           <a:p>
             <a:fld id="{67C6F52A-A82B-47A2-A83A-8C4C91F2D59F}" type="datetimeFigureOut">
               <a:rPr lang="en-US" dirty="0"/>
-              <a:t>7/30/2021</a:t>
+              <a:t>8/1/2021</a:t>
             </a:fld>
             <a:endParaRPr lang="en-US" dirty="0"/>
           </a:p>
@@ -816,7 +816,7 @@
           <a:p>
             <a:fld id="{F070A7B3-6521-4DCA-87E5-044747A908C1}" type="datetimeFigureOut">
               <a:rPr lang="en-US" dirty="0"/>
-              <a:t>7/30/2021</a:t>
+              <a:t>8/1/2021</a:t>
             </a:fld>
             <a:endParaRPr lang="en-US" dirty="0"/>
           </a:p>
@@ -1080,7 +1080,7 @@
           <a:p>
             <a:fld id="{1160EA64-D806-43AC-9DF2-F8C432F32B4C}" type="datetimeFigureOut">
               <a:rPr lang="en-US" dirty="0"/>
-              <a:t>7/30/2021</a:t>
+              <a:t>8/1/2021</a:t>
             </a:fld>
             <a:endParaRPr lang="en-US" dirty="0"/>
           </a:p>
@@ -1308,7 +1308,7 @@
           <a:p>
             <a:fld id="{AB134690-1557-4C89-A502-4959FE7FAD70}" type="datetimeFigureOut">
               <a:rPr lang="en-US" dirty="0"/>
-              <a:t>7/30/2021</a:t>
+              <a:t>8/1/2021</a:t>
             </a:fld>
             <a:endParaRPr lang="en-US" dirty="0"/>
           </a:p>
@@ -1662,7 +1662,7 @@
           <a:p>
             <a:fld id="{4F7D4976-E339-4826-83B7-FBD03F55ECF8}" type="datetimeFigureOut">
               <a:rPr lang="en-US" dirty="0"/>
-              <a:t>7/30/2021</a:t>
+              <a:t>8/1/2021</a:t>
             </a:fld>
             <a:endParaRPr lang="en-US" dirty="0"/>
           </a:p>
@@ -1798,7 +1798,7 @@
           <a:p>
             <a:fld id="{E1037C31-9E7A-4F99-8774-A0E530DE1A42}" type="datetimeFigureOut">
               <a:rPr lang="en-US" dirty="0"/>
-              <a:t>7/30/2021</a:t>
+              <a:t>8/1/2021</a:t>
             </a:fld>
             <a:endParaRPr lang="en-US" dirty="0"/>
           </a:p>
@@ -1888,7 +1888,7 @@
           <a:p>
             <a:fld id="{C278504F-A551-4DE0-9316-4DCD1D8CC752}" type="datetimeFigureOut">
               <a:rPr lang="en-US" dirty="0"/>
-              <a:t>7/30/2021</a:t>
+              <a:t>8/1/2021</a:t>
             </a:fld>
             <a:endParaRPr lang="en-US" dirty="0"/>
           </a:p>
@@ -2240,7 +2240,7 @@
           <a:p>
             <a:fld id="{D1BE4249-C0D0-4B06-8692-E8BB871AF643}" type="datetimeFigureOut">
               <a:rPr lang="en-US" dirty="0"/>
-              <a:t>7/30/2021</a:t>
+              <a:t>8/1/2021</a:t>
             </a:fld>
             <a:endParaRPr lang="en-US" dirty="0"/>
           </a:p>
@@ -2592,7 +2592,7 @@
           <a:p>
             <a:fld id="{042B0DB6-F5C7-45FB-8CF3-31B45F9C2DAC}" type="datetimeFigureOut">
               <a:rPr lang="en-US" dirty="0"/>
-              <a:t>7/30/2021</a:t>
+              <a:t>8/1/2021</a:t>
             </a:fld>
             <a:endParaRPr lang="en-US" dirty="0"/>
           </a:p>
@@ -2828,7 +2828,7 @@
           <a:p>
             <a:fld id="{1160EA64-D806-43AC-9DF2-F8C432F32B4C}" type="datetimeFigureOut">
               <a:rPr lang="en-US" dirty="0"/>
-              <a:t>7/30/2021</a:t>
+              <a:t>8/1/2021</a:t>
             </a:fld>
             <a:endParaRPr lang="en-US" dirty="0"/>
           </a:p>
@@ -5198,7 +5198,7 @@
           <a:p>
             <a:r>
               <a:rPr lang="en-US" dirty="0"/>
-              <a:t>Many skeptics suggest that there is not clear evidence that GM maize has yield gains in South Africa that benefit producers</a:t>
+              <a:t>Some skeptics have claimed that there is not clear evidence of GM maize yield gains in South Africa</a:t>
             </a:r>
           </a:p>
         </p:txBody>
@@ -5814,7 +5814,7 @@
         </p:nvSpPr>
         <p:spPr>
           <a:xfrm>
-            <a:off x="866162" y="523613"/>
+            <a:off x="866160" y="517376"/>
             <a:ext cx="3864864" cy="1188720"/>
           </a:xfrm>
         </p:spPr>
@@ -6025,41 +6025,6 @@
           <a:chExt cx="0" cy="0"/>
         </a:xfrm>
       </p:grpSpPr>
-      <p:sp>
-        <p:nvSpPr>
-          <p:cNvPr id="5" name="Content Placeholder 4">
-            <a:extLst>
-              <a:ext uri="{FF2B5EF4-FFF2-40B4-BE49-F238E27FC236}">
-                <a16:creationId xmlns:a16="http://schemas.microsoft.com/office/drawing/2014/main" id="{46B40487-3A62-4504-ADD1-DFB364664E3F}"/>
-              </a:ext>
-            </a:extLst>
-          </p:cNvPr>
-          <p:cNvSpPr>
-            <a:spLocks noGrp="1"/>
-          </p:cNvSpPr>
-          <p:nvPr>
-            <p:ph idx="1"/>
-          </p:nvPr>
-        </p:nvSpPr>
-        <p:spPr>
-          <a:xfrm>
-            <a:off x="2231136" y="622207"/>
-            <a:ext cx="7729728" cy="3101983"/>
-          </a:xfrm>
-        </p:spPr>
-        <p:txBody>
-          <a:bodyPr>
-            <a:normAutofit/>
-          </a:bodyPr>
-          <a:lstStyle/>
-          <a:p>
-            <a:r>
-              <a:rPr lang="en-US" sz="2400" b="1" dirty="0"/>
-              <a:t>PLACE HOLDER FOR EXPLORTORY PLOT OF GM VS CONVENTIONAL YIELDS OVER TIME</a:t>
-            </a:r>
-          </a:p>
-        </p:txBody>
-      </p:sp>
       <p:pic>
         <p:nvPicPr>
           <p:cNvPr id="4" name="Picture 3" descr="Chart, line chart&#10;&#10;Description automatically generated">
@@ -6090,6 +6055,31 @@
           </a:prstGeom>
         </p:spPr>
       </p:pic>
+      <p:sp>
+        <p:nvSpPr>
+          <p:cNvPr id="3" name="Content Placeholder 2">
+            <a:extLst>
+              <a:ext uri="{FF2B5EF4-FFF2-40B4-BE49-F238E27FC236}">
+                <a16:creationId xmlns:a16="http://schemas.microsoft.com/office/drawing/2014/main" id="{ADE93596-A1A4-4259-81D5-E0B0C5E74A89}"/>
+              </a:ext>
+            </a:extLst>
+          </p:cNvPr>
+          <p:cNvSpPr>
+            <a:spLocks noGrp="1"/>
+          </p:cNvSpPr>
+          <p:nvPr>
+            <p:ph idx="1"/>
+          </p:nvPr>
+        </p:nvSpPr>
+        <p:spPr/>
+        <p:txBody>
+          <a:bodyPr/>
+          <a:lstStyle/>
+          <a:p>
+            <a:endParaRPr lang="en-US"/>
+          </a:p>
+        </p:txBody>
+      </p:sp>
     </p:spTree>
     <p:extLst>
       <p:ext uri="{BB962C8B-B14F-4D97-AF65-F5344CB8AC3E}">

</xml_diff>